<commit_message>
[CLEAN] some codes edited at 2016.03.25-17:57
</commit_message>
<xml_diff>
--- a/docs/lab5th_slankdev.pptx
+++ b/docs/lab5th_slankdev.pptx
@@ -5,12 +5,23 @@
     <p:sldMasterId id="2147483720" r:id="rId1"/>
   </p:sldMasterIdLst>
   <p:notesMasterIdLst>
-    <p:notesMasterId r:id="rId5"/>
+    <p:notesMasterId r:id="rId16"/>
   </p:notesMasterIdLst>
   <p:sldIdLst>
     <p:sldId id="256" r:id="rId2"/>
-    <p:sldId id="259" r:id="rId3"/>
-    <p:sldId id="258" r:id="rId4"/>
+    <p:sldId id="258" r:id="rId3"/>
+    <p:sldId id="266" r:id="rId4"/>
+    <p:sldId id="260" r:id="rId5"/>
+    <p:sldId id="259" r:id="rId6"/>
+    <p:sldId id="261" r:id="rId7"/>
+    <p:sldId id="262" r:id="rId8"/>
+    <p:sldId id="267" r:id="rId9"/>
+    <p:sldId id="268" r:id="rId10"/>
+    <p:sldId id="264" r:id="rId11"/>
+    <p:sldId id="270" r:id="rId12"/>
+    <p:sldId id="271" r:id="rId13"/>
+    <p:sldId id="265" r:id="rId14"/>
+    <p:sldId id="269" r:id="rId15"/>
   </p:sldIdLst>
   <p:sldSz cx="9144000" cy="6858000" type="screen4x3"/>
   <p:notesSz cx="6858000" cy="9144000"/>
@@ -199,7 +210,7 @@
           <a:p>
             <a:fld id="{FF4DCCE5-B6DB-3843-BE9C-6174395B0B3B}" type="datetimeFigureOut">
               <a:rPr lang="en-US" smtClean="0"/>
-              <a:t>3/23/16</a:t>
+              <a:t>3/25/16</a:t>
             </a:fld>
             <a:endParaRPr lang="en-US"/>
           </a:p>
@@ -776,7 +787,7 @@
           <a:lstStyle/>
           <a:p>
             <a:r>
-              <a:rPr lang="Zyyy" smtClean="0"/>
+              <a:rPr lang="x-none" smtClean="0"/>
               <a:t>3/30/16</a:t>
             </a:r>
             <a:endParaRPr lang="en-US"/>
@@ -995,7 +1006,7 @@
           <a:lstStyle/>
           <a:p>
             <a:r>
-              <a:rPr lang="Zyyy" smtClean="0"/>
+              <a:rPr lang="x-none" smtClean="0"/>
               <a:t>3/30/16</a:t>
             </a:r>
             <a:endParaRPr lang="en-US"/>
@@ -1262,7 +1273,7 @@
           <a:lstStyle/>
           <a:p>
             <a:r>
-              <a:rPr lang="Zyyy" smtClean="0"/>
+              <a:rPr lang="x-none" smtClean="0"/>
               <a:t>3/30/16</a:t>
             </a:r>
             <a:endParaRPr lang="en-US"/>
@@ -1470,7 +1481,7 @@
           <a:lstStyle/>
           <a:p>
             <a:r>
-              <a:rPr lang="Zyyy" smtClean="0"/>
+              <a:rPr lang="x-none" smtClean="0"/>
               <a:t>3/30/16</a:t>
             </a:r>
             <a:endParaRPr lang="en-US"/>
@@ -1824,7 +1835,7 @@
           <a:lstStyle/>
           <a:p>
             <a:r>
-              <a:rPr lang="Zyyy" smtClean="0"/>
+              <a:rPr lang="x-none" smtClean="0"/>
               <a:t>3/30/16</a:t>
             </a:r>
             <a:endParaRPr lang="en-US"/>
@@ -2150,7 +2161,7 @@
           <a:lstStyle/>
           <a:p>
             <a:r>
-              <a:rPr lang="Zyyy" smtClean="0"/>
+              <a:rPr lang="x-none" smtClean="0"/>
               <a:t>3/30/16</a:t>
             </a:r>
             <a:endParaRPr lang="en-US"/>
@@ -2558,7 +2569,7 @@
           <a:lstStyle/>
           <a:p>
             <a:r>
-              <a:rPr lang="Zyyy" smtClean="0"/>
+              <a:rPr lang="x-none" smtClean="0"/>
               <a:t>3/30/16</a:t>
             </a:r>
             <a:endParaRPr lang="en-US"/>
@@ -2680,7 +2691,7 @@
           <a:lstStyle/>
           <a:p>
             <a:r>
-              <a:rPr lang="Zyyy" smtClean="0"/>
+              <a:rPr lang="x-none" smtClean="0"/>
               <a:t>3/30/16</a:t>
             </a:r>
             <a:endParaRPr lang="en-US"/>
@@ -2855,7 +2866,7 @@
           <a:lstStyle/>
           <a:p>
             <a:r>
-              <a:rPr lang="Zyyy" smtClean="0"/>
+              <a:rPr lang="x-none" smtClean="0"/>
               <a:t>3/30/16</a:t>
             </a:r>
             <a:endParaRPr lang="en-US"/>
@@ -3220,7 +3231,7 @@
           </a:lstStyle>
           <a:p>
             <a:r>
-              <a:rPr lang="Zyyy" smtClean="0"/>
+              <a:rPr lang="x-none" smtClean="0"/>
               <a:t>3/30/16</a:t>
             </a:r>
             <a:endParaRPr lang="en-US"/>
@@ -3601,7 +3612,7 @@
           <a:lstStyle/>
           <a:p>
             <a:r>
-              <a:rPr lang="Zyyy" smtClean="0"/>
+              <a:rPr lang="x-none" smtClean="0"/>
               <a:t>3/30/16</a:t>
             </a:r>
             <a:endParaRPr lang="en-US"/>
@@ -3892,7 +3903,7 @@
           </a:lstStyle>
           <a:p>
             <a:r>
-              <a:rPr lang="Zyyy" smtClean="0"/>
+              <a:rPr lang="x-none" smtClean="0"/>
               <a:t>3/30/16</a:t>
             </a:r>
             <a:endParaRPr lang="en-US" dirty="0"/>
@@ -4456,11 +4467,7 @@
             </a:br>
             <a:r>
               <a:rPr lang="ja-JP" altLang="en-US" sz="5400" dirty="0" smtClean="0"/>
-              <a:t>拡張</a:t>
-            </a:r>
-            <a:r>
-              <a:rPr lang="ja-JP" altLang="en-US" sz="5400" dirty="0" smtClean="0"/>
-              <a:t>可能な</a:t>
+              <a:t>拡張可能な</a:t>
             </a:r>
             <a:br>
               <a:rPr lang="ja-JP" altLang="en-US" sz="5400" dirty="0" smtClean="0"/>
@@ -4543,6 +4550,803 @@
   <p:clrMapOvr>
     <a:masterClrMapping/>
   </p:clrMapOvr>
+  <p:timing>
+    <p:tnLst>
+      <p:par>
+        <p:cTn id="1" dur="indefinite" restart="never" nodeType="tmRoot"/>
+      </p:par>
+    </p:tnLst>
+  </p:timing>
+</p:sld>
+</file>
+
+<file path=ppt/slides/slide10.xml><?xml version="1.0" encoding="utf-8"?>
+<p:sld xmlns:a="http://schemas.openxmlformats.org/drawingml/2006/main" xmlns:r="http://schemas.openxmlformats.org/officeDocument/2006/relationships" xmlns:p="http://schemas.openxmlformats.org/presentationml/2006/main">
+  <p:cSld>
+    <p:spTree>
+      <p:nvGrpSpPr>
+        <p:cNvPr id="1" name=""/>
+        <p:cNvGrpSpPr/>
+        <p:nvPr/>
+      </p:nvGrpSpPr>
+      <p:grpSpPr>
+        <a:xfrm>
+          <a:off x="0" y="0"/>
+          <a:ext cx="0" cy="0"/>
+          <a:chOff x="0" y="0"/>
+          <a:chExt cx="0" cy="0"/>
+        </a:xfrm>
+      </p:grpSpPr>
+      <p:sp>
+        <p:nvSpPr>
+          <p:cNvPr id="2" name="Title 1"/>
+          <p:cNvSpPr>
+            <a:spLocks noGrp="1"/>
+          </p:cNvSpPr>
+          <p:nvPr>
+            <p:ph type="title"/>
+          </p:nvPr>
+        </p:nvSpPr>
+        <p:spPr/>
+        <p:txBody>
+          <a:bodyPr/>
+          <a:lstStyle/>
+          <a:p>
+            <a:r>
+              <a:rPr lang="ja-JP" altLang="en-US" dirty="0" smtClean="0"/>
+              <a:t>使用例の</a:t>
+            </a:r>
+            <a:r>
+              <a:rPr lang="ja-JP" altLang="en-US" dirty="0" smtClean="0"/>
+              <a:t>デモ</a:t>
+            </a:r>
+            <a:endParaRPr lang="en-US" dirty="0"/>
+          </a:p>
+        </p:txBody>
+      </p:sp>
+      <p:sp>
+        <p:nvSpPr>
+          <p:cNvPr id="3" name="Content Placeholder 2"/>
+          <p:cNvSpPr>
+            <a:spLocks noGrp="1"/>
+          </p:cNvSpPr>
+          <p:nvPr>
+            <p:ph idx="1"/>
+          </p:nvPr>
+        </p:nvSpPr>
+        <p:spPr/>
+        <p:txBody>
+          <a:bodyPr/>
+          <a:lstStyle/>
+          <a:p>
+            <a:r>
+              <a:rPr lang="ja-JP" altLang="en-US" dirty="0" smtClean="0"/>
+              <a:t>時間配分に合わせて以下のデモを行います</a:t>
+            </a:r>
+          </a:p>
+          <a:p>
+            <a:pPr lvl="1"/>
+            <a:r>
+              <a:rPr lang="en-US" altLang="ja-JP" dirty="0"/>
+              <a:t>ARP</a:t>
+            </a:r>
+            <a:r>
+              <a:rPr lang="ja-JP" altLang="en-US" dirty="0"/>
+              <a:t>モニタープログラム</a:t>
+            </a:r>
+            <a:endParaRPr lang="en-US" altLang="ja-JP" dirty="0"/>
+          </a:p>
+          <a:p>
+            <a:pPr lvl="1"/>
+            <a:r>
+              <a:rPr lang="ja-JP" altLang="en-US" dirty="0"/>
+              <a:t>新たな</a:t>
+            </a:r>
+            <a:r>
+              <a:rPr lang="ja-JP" altLang="en-US" dirty="0" smtClean="0"/>
+              <a:t>プロトコル</a:t>
+            </a:r>
+            <a:r>
+              <a:rPr lang="ja-JP" altLang="en-US" dirty="0" smtClean="0"/>
+              <a:t>の</a:t>
+            </a:r>
+            <a:r>
+              <a:rPr lang="ja-JP" altLang="en-US" dirty="0" smtClean="0"/>
+              <a:t>パケット解析</a:t>
+            </a:r>
+            <a:endParaRPr lang="ja-JP" altLang="en-US" dirty="0" smtClean="0"/>
+          </a:p>
+          <a:p>
+            <a:endParaRPr lang="en-US" dirty="0"/>
+          </a:p>
+        </p:txBody>
+      </p:sp>
+      <p:sp>
+        <p:nvSpPr>
+          <p:cNvPr id="4" name="Date Placeholder 3"/>
+          <p:cNvSpPr>
+            <a:spLocks noGrp="1"/>
+          </p:cNvSpPr>
+          <p:nvPr>
+            <p:ph type="dt" sz="half" idx="10"/>
+          </p:nvPr>
+        </p:nvSpPr>
+        <p:spPr/>
+        <p:txBody>
+          <a:bodyPr/>
+          <a:lstStyle/>
+          <a:p>
+            <a:r>
+              <a:rPr lang="x-none" smtClean="0"/>
+              <a:t>3/30/16</a:t>
+            </a:r>
+            <a:endParaRPr lang="en-US"/>
+          </a:p>
+        </p:txBody>
+      </p:sp>
+      <p:sp>
+        <p:nvSpPr>
+          <p:cNvPr id="5" name="Footer Placeholder 4"/>
+          <p:cNvSpPr>
+            <a:spLocks noGrp="1"/>
+          </p:cNvSpPr>
+          <p:nvPr>
+            <p:ph type="ftr" sz="quarter" idx="11"/>
+          </p:nvPr>
+        </p:nvSpPr>
+        <p:spPr/>
+        <p:txBody>
+          <a:bodyPr/>
+          <a:lstStyle/>
+          <a:p>
+            <a:r>
+              <a:rPr lang="ja-JP" altLang="en-US" smtClean="0"/>
+              <a:t>サイボウズ・ラボユース成果報告会</a:t>
+            </a:r>
+            <a:endParaRPr lang="en-US"/>
+          </a:p>
+        </p:txBody>
+      </p:sp>
+      <p:sp>
+        <p:nvSpPr>
+          <p:cNvPr id="6" name="Slide Number Placeholder 5"/>
+          <p:cNvSpPr>
+            <a:spLocks noGrp="1"/>
+          </p:cNvSpPr>
+          <p:nvPr>
+            <p:ph type="sldNum" sz="quarter" idx="12"/>
+          </p:nvPr>
+        </p:nvSpPr>
+        <p:spPr/>
+        <p:txBody>
+          <a:bodyPr/>
+          <a:lstStyle/>
+          <a:p>
+            <a:fld id="{CC15D400-9C14-254D-84D7-AF2EB5526E40}" type="slidenum">
+              <a:rPr lang="en-US" smtClean="0"/>
+              <a:t>10</a:t>
+            </a:fld>
+            <a:endParaRPr lang="en-US"/>
+          </a:p>
+        </p:txBody>
+      </p:sp>
+    </p:spTree>
+    <p:extLst>
+      <p:ext uri="{BB962C8B-B14F-4D97-AF65-F5344CB8AC3E}">
+        <p14:creationId xmlns:p14="http://schemas.microsoft.com/office/powerpoint/2010/main" val="1272750297"/>
+      </p:ext>
+    </p:extLst>
+  </p:cSld>
+  <p:clrMapOvr>
+    <a:masterClrMapping/>
+  </p:clrMapOvr>
+  <p:timing>
+    <p:tnLst>
+      <p:par>
+        <p:cTn id="1" dur="indefinite" restart="never" nodeType="tmRoot"/>
+      </p:par>
+    </p:tnLst>
+  </p:timing>
+</p:sld>
+</file>
+
+<file path=ppt/slides/slide11.xml><?xml version="1.0" encoding="utf-8"?>
+<p:sld xmlns:a="http://schemas.openxmlformats.org/drawingml/2006/main" xmlns:r="http://schemas.openxmlformats.org/officeDocument/2006/relationships" xmlns:p="http://schemas.openxmlformats.org/presentationml/2006/main">
+  <p:cSld>
+    <p:spTree>
+      <p:nvGrpSpPr>
+        <p:cNvPr id="1" name=""/>
+        <p:cNvGrpSpPr/>
+        <p:nvPr/>
+      </p:nvGrpSpPr>
+      <p:grpSpPr>
+        <a:xfrm>
+          <a:off x="0" y="0"/>
+          <a:ext cx="0" cy="0"/>
+          <a:chOff x="0" y="0"/>
+          <a:chExt cx="0" cy="0"/>
+        </a:xfrm>
+      </p:grpSpPr>
+      <p:sp>
+        <p:nvSpPr>
+          <p:cNvPr id="2" name="Title 1"/>
+          <p:cNvSpPr>
+            <a:spLocks noGrp="1"/>
+          </p:cNvSpPr>
+          <p:nvPr>
+            <p:ph type="title"/>
+          </p:nvPr>
+        </p:nvSpPr>
+        <p:spPr/>
+        <p:txBody>
+          <a:bodyPr/>
+          <a:lstStyle/>
+          <a:p>
+            <a:r>
+              <a:rPr lang="en-US" dirty="0" smtClean="0"/>
+              <a:t>ARP</a:t>
+            </a:r>
+            <a:r>
+              <a:rPr lang="ja-JP" altLang="en-US" dirty="0" smtClean="0"/>
+              <a:t>モニタープログラム</a:t>
+            </a:r>
+            <a:endParaRPr lang="en-US" dirty="0"/>
+          </a:p>
+        </p:txBody>
+      </p:sp>
+      <p:sp>
+        <p:nvSpPr>
+          <p:cNvPr id="3" name="Content Placeholder 2"/>
+          <p:cNvSpPr>
+            <a:spLocks noGrp="1"/>
+          </p:cNvSpPr>
+          <p:nvPr>
+            <p:ph idx="1"/>
+          </p:nvPr>
+        </p:nvSpPr>
+        <p:spPr/>
+        <p:txBody>
+          <a:bodyPr/>
+          <a:lstStyle/>
+          <a:p>
+            <a:endParaRPr lang="en-US"/>
+          </a:p>
+        </p:txBody>
+      </p:sp>
+      <p:sp>
+        <p:nvSpPr>
+          <p:cNvPr id="4" name="Date Placeholder 3"/>
+          <p:cNvSpPr>
+            <a:spLocks noGrp="1"/>
+          </p:cNvSpPr>
+          <p:nvPr>
+            <p:ph type="dt" sz="half" idx="10"/>
+          </p:nvPr>
+        </p:nvSpPr>
+        <p:spPr/>
+        <p:txBody>
+          <a:bodyPr/>
+          <a:lstStyle/>
+          <a:p>
+            <a:r>
+              <a:rPr lang="x-none" smtClean="0"/>
+              <a:t>3/30/16</a:t>
+            </a:r>
+            <a:endParaRPr lang="en-US"/>
+          </a:p>
+        </p:txBody>
+      </p:sp>
+      <p:sp>
+        <p:nvSpPr>
+          <p:cNvPr id="5" name="Footer Placeholder 4"/>
+          <p:cNvSpPr>
+            <a:spLocks noGrp="1"/>
+          </p:cNvSpPr>
+          <p:nvPr>
+            <p:ph type="ftr" sz="quarter" idx="11"/>
+          </p:nvPr>
+        </p:nvSpPr>
+        <p:spPr/>
+        <p:txBody>
+          <a:bodyPr/>
+          <a:lstStyle/>
+          <a:p>
+            <a:r>
+              <a:rPr lang="ja-JP" altLang="en-US" smtClean="0"/>
+              <a:t>サイボウズ・ラボユース成果報告会</a:t>
+            </a:r>
+            <a:endParaRPr lang="en-US"/>
+          </a:p>
+        </p:txBody>
+      </p:sp>
+      <p:sp>
+        <p:nvSpPr>
+          <p:cNvPr id="6" name="Slide Number Placeholder 5"/>
+          <p:cNvSpPr>
+            <a:spLocks noGrp="1"/>
+          </p:cNvSpPr>
+          <p:nvPr>
+            <p:ph type="sldNum" sz="quarter" idx="12"/>
+          </p:nvPr>
+        </p:nvSpPr>
+        <p:spPr/>
+        <p:txBody>
+          <a:bodyPr/>
+          <a:lstStyle/>
+          <a:p>
+            <a:fld id="{CC15D400-9C14-254D-84D7-AF2EB5526E40}" type="slidenum">
+              <a:rPr lang="en-US" smtClean="0"/>
+              <a:t>11</a:t>
+            </a:fld>
+            <a:endParaRPr lang="en-US"/>
+          </a:p>
+        </p:txBody>
+      </p:sp>
+    </p:spTree>
+    <p:extLst>
+      <p:ext uri="{BB962C8B-B14F-4D97-AF65-F5344CB8AC3E}">
+        <p14:creationId xmlns:p14="http://schemas.microsoft.com/office/powerpoint/2010/main" val="525954553"/>
+      </p:ext>
+    </p:extLst>
+  </p:cSld>
+  <p:clrMapOvr>
+    <a:masterClrMapping/>
+  </p:clrMapOvr>
+  <p:timing>
+    <p:tnLst>
+      <p:par>
+        <p:cTn id="1" dur="indefinite" restart="never" nodeType="tmRoot"/>
+      </p:par>
+    </p:tnLst>
+  </p:timing>
+</p:sld>
+</file>
+
+<file path=ppt/slides/slide12.xml><?xml version="1.0" encoding="utf-8"?>
+<p:sld xmlns:a="http://schemas.openxmlformats.org/drawingml/2006/main" xmlns:r="http://schemas.openxmlformats.org/officeDocument/2006/relationships" xmlns:p="http://schemas.openxmlformats.org/presentationml/2006/main">
+  <p:cSld>
+    <p:spTree>
+      <p:nvGrpSpPr>
+        <p:cNvPr id="1" name=""/>
+        <p:cNvGrpSpPr/>
+        <p:nvPr/>
+      </p:nvGrpSpPr>
+      <p:grpSpPr>
+        <a:xfrm>
+          <a:off x="0" y="0"/>
+          <a:ext cx="0" cy="0"/>
+          <a:chOff x="0" y="0"/>
+          <a:chExt cx="0" cy="0"/>
+        </a:xfrm>
+      </p:grpSpPr>
+      <p:sp>
+        <p:nvSpPr>
+          <p:cNvPr id="2" name="Title 1"/>
+          <p:cNvSpPr>
+            <a:spLocks noGrp="1"/>
+          </p:cNvSpPr>
+          <p:nvPr>
+            <p:ph type="title"/>
+          </p:nvPr>
+        </p:nvSpPr>
+        <p:spPr/>
+        <p:txBody>
+          <a:bodyPr/>
+          <a:lstStyle/>
+          <a:p>
+            <a:r>
+              <a:rPr lang="ja-JP" altLang="en-US" dirty="0" smtClean="0"/>
+              <a:t>新たなプロトコルのパケット解析</a:t>
+            </a:r>
+            <a:endParaRPr lang="en-US" dirty="0"/>
+          </a:p>
+        </p:txBody>
+      </p:sp>
+      <p:sp>
+        <p:nvSpPr>
+          <p:cNvPr id="3" name="Content Placeholder 2"/>
+          <p:cNvSpPr>
+            <a:spLocks noGrp="1"/>
+          </p:cNvSpPr>
+          <p:nvPr>
+            <p:ph idx="1"/>
+          </p:nvPr>
+        </p:nvSpPr>
+        <p:spPr/>
+        <p:txBody>
+          <a:bodyPr/>
+          <a:lstStyle/>
+          <a:p>
+            <a:endParaRPr lang="en-US"/>
+          </a:p>
+        </p:txBody>
+      </p:sp>
+      <p:sp>
+        <p:nvSpPr>
+          <p:cNvPr id="4" name="Date Placeholder 3"/>
+          <p:cNvSpPr>
+            <a:spLocks noGrp="1"/>
+          </p:cNvSpPr>
+          <p:nvPr>
+            <p:ph type="dt" sz="half" idx="10"/>
+          </p:nvPr>
+        </p:nvSpPr>
+        <p:spPr/>
+        <p:txBody>
+          <a:bodyPr/>
+          <a:lstStyle/>
+          <a:p>
+            <a:r>
+              <a:rPr lang="x-none" smtClean="0"/>
+              <a:t>3/30/16</a:t>
+            </a:r>
+            <a:endParaRPr lang="en-US"/>
+          </a:p>
+        </p:txBody>
+      </p:sp>
+      <p:sp>
+        <p:nvSpPr>
+          <p:cNvPr id="5" name="Footer Placeholder 4"/>
+          <p:cNvSpPr>
+            <a:spLocks noGrp="1"/>
+          </p:cNvSpPr>
+          <p:nvPr>
+            <p:ph type="ftr" sz="quarter" idx="11"/>
+          </p:nvPr>
+        </p:nvSpPr>
+        <p:spPr/>
+        <p:txBody>
+          <a:bodyPr/>
+          <a:lstStyle/>
+          <a:p>
+            <a:r>
+              <a:rPr lang="ja-JP" altLang="en-US" smtClean="0"/>
+              <a:t>サイボウズ・ラボユース成果報告会</a:t>
+            </a:r>
+            <a:endParaRPr lang="en-US"/>
+          </a:p>
+        </p:txBody>
+      </p:sp>
+      <p:sp>
+        <p:nvSpPr>
+          <p:cNvPr id="6" name="Slide Number Placeholder 5"/>
+          <p:cNvSpPr>
+            <a:spLocks noGrp="1"/>
+          </p:cNvSpPr>
+          <p:nvPr>
+            <p:ph type="sldNum" sz="quarter" idx="12"/>
+          </p:nvPr>
+        </p:nvSpPr>
+        <p:spPr/>
+        <p:txBody>
+          <a:bodyPr/>
+          <a:lstStyle/>
+          <a:p>
+            <a:fld id="{CC15D400-9C14-254D-84D7-AF2EB5526E40}" type="slidenum">
+              <a:rPr lang="en-US" smtClean="0"/>
+              <a:t>12</a:t>
+            </a:fld>
+            <a:endParaRPr lang="en-US"/>
+          </a:p>
+        </p:txBody>
+      </p:sp>
+    </p:spTree>
+    <p:extLst>
+      <p:ext uri="{BB962C8B-B14F-4D97-AF65-F5344CB8AC3E}">
+        <p14:creationId xmlns:p14="http://schemas.microsoft.com/office/powerpoint/2010/main" val="1682168866"/>
+      </p:ext>
+    </p:extLst>
+  </p:cSld>
+  <p:clrMapOvr>
+    <a:masterClrMapping/>
+  </p:clrMapOvr>
+  <p:timing>
+    <p:tnLst>
+      <p:par>
+        <p:cTn id="1" dur="indefinite" restart="never" nodeType="tmRoot"/>
+      </p:par>
+    </p:tnLst>
+  </p:timing>
+</p:sld>
+</file>
+
+<file path=ppt/slides/slide13.xml><?xml version="1.0" encoding="utf-8"?>
+<p:sld xmlns:a="http://schemas.openxmlformats.org/drawingml/2006/main" xmlns:r="http://schemas.openxmlformats.org/officeDocument/2006/relationships" xmlns:p="http://schemas.openxmlformats.org/presentationml/2006/main">
+  <p:cSld>
+    <p:spTree>
+      <p:nvGrpSpPr>
+        <p:cNvPr id="1" name=""/>
+        <p:cNvGrpSpPr/>
+        <p:nvPr/>
+      </p:nvGrpSpPr>
+      <p:grpSpPr>
+        <a:xfrm>
+          <a:off x="0" y="0"/>
+          <a:ext cx="0" cy="0"/>
+          <a:chOff x="0" y="0"/>
+          <a:chExt cx="0" cy="0"/>
+        </a:xfrm>
+      </p:grpSpPr>
+      <p:sp>
+        <p:nvSpPr>
+          <p:cNvPr id="2" name="Title 1"/>
+          <p:cNvSpPr>
+            <a:spLocks noGrp="1"/>
+          </p:cNvSpPr>
+          <p:nvPr>
+            <p:ph type="title"/>
+          </p:nvPr>
+        </p:nvSpPr>
+        <p:spPr/>
+        <p:txBody>
+          <a:bodyPr/>
+          <a:lstStyle/>
+          <a:p>
+            <a:r>
+              <a:rPr lang="ja-JP" altLang="en-US" dirty="0" smtClean="0"/>
+              <a:t>今後</a:t>
+            </a:r>
+            <a:r>
+              <a:rPr lang="ja-JP" altLang="en-US" dirty="0" smtClean="0"/>
+              <a:t>の展開</a:t>
+            </a:r>
+            <a:endParaRPr lang="en-US" dirty="0"/>
+          </a:p>
+        </p:txBody>
+      </p:sp>
+      <p:sp>
+        <p:nvSpPr>
+          <p:cNvPr id="3" name="Content Placeholder 2"/>
+          <p:cNvSpPr>
+            <a:spLocks noGrp="1"/>
+          </p:cNvSpPr>
+          <p:nvPr>
+            <p:ph idx="1"/>
+          </p:nvPr>
+        </p:nvSpPr>
+        <p:spPr/>
+        <p:txBody>
+          <a:bodyPr/>
+          <a:lstStyle/>
+          <a:p>
+            <a:endParaRPr lang="en-US"/>
+          </a:p>
+        </p:txBody>
+      </p:sp>
+      <p:sp>
+        <p:nvSpPr>
+          <p:cNvPr id="4" name="Date Placeholder 3"/>
+          <p:cNvSpPr>
+            <a:spLocks noGrp="1"/>
+          </p:cNvSpPr>
+          <p:nvPr>
+            <p:ph type="dt" sz="half" idx="10"/>
+          </p:nvPr>
+        </p:nvSpPr>
+        <p:spPr/>
+        <p:txBody>
+          <a:bodyPr/>
+          <a:lstStyle/>
+          <a:p>
+            <a:r>
+              <a:rPr lang="x-none" smtClean="0"/>
+              <a:t>3/30/16</a:t>
+            </a:r>
+            <a:endParaRPr lang="en-US"/>
+          </a:p>
+        </p:txBody>
+      </p:sp>
+      <p:sp>
+        <p:nvSpPr>
+          <p:cNvPr id="5" name="Footer Placeholder 4"/>
+          <p:cNvSpPr>
+            <a:spLocks noGrp="1"/>
+          </p:cNvSpPr>
+          <p:nvPr>
+            <p:ph type="ftr" sz="quarter" idx="11"/>
+          </p:nvPr>
+        </p:nvSpPr>
+        <p:spPr/>
+        <p:txBody>
+          <a:bodyPr/>
+          <a:lstStyle/>
+          <a:p>
+            <a:r>
+              <a:rPr lang="ja-JP" altLang="en-US" smtClean="0"/>
+              <a:t>サイボウズ・ラボユース成果報告会</a:t>
+            </a:r>
+            <a:endParaRPr lang="en-US"/>
+          </a:p>
+        </p:txBody>
+      </p:sp>
+      <p:sp>
+        <p:nvSpPr>
+          <p:cNvPr id="6" name="Slide Number Placeholder 5"/>
+          <p:cNvSpPr>
+            <a:spLocks noGrp="1"/>
+          </p:cNvSpPr>
+          <p:nvPr>
+            <p:ph type="sldNum" sz="quarter" idx="12"/>
+          </p:nvPr>
+        </p:nvSpPr>
+        <p:spPr/>
+        <p:txBody>
+          <a:bodyPr/>
+          <a:lstStyle/>
+          <a:p>
+            <a:fld id="{CC15D400-9C14-254D-84D7-AF2EB5526E40}" type="slidenum">
+              <a:rPr lang="en-US" smtClean="0"/>
+              <a:t>13</a:t>
+            </a:fld>
+            <a:endParaRPr lang="en-US"/>
+          </a:p>
+        </p:txBody>
+      </p:sp>
+    </p:spTree>
+    <p:extLst>
+      <p:ext uri="{BB962C8B-B14F-4D97-AF65-F5344CB8AC3E}">
+        <p14:creationId xmlns:p14="http://schemas.microsoft.com/office/powerpoint/2010/main" val="262191114"/>
+      </p:ext>
+    </p:extLst>
+  </p:cSld>
+  <p:clrMapOvr>
+    <a:masterClrMapping/>
+  </p:clrMapOvr>
+  <p:timing>
+    <p:tnLst>
+      <p:par>
+        <p:cTn id="1" dur="indefinite" restart="never" nodeType="tmRoot"/>
+      </p:par>
+    </p:tnLst>
+  </p:timing>
+</p:sld>
+</file>
+
+<file path=ppt/slides/slide14.xml><?xml version="1.0" encoding="utf-8"?>
+<p:sld xmlns:a="http://schemas.openxmlformats.org/drawingml/2006/main" xmlns:r="http://schemas.openxmlformats.org/officeDocument/2006/relationships" xmlns:p="http://schemas.openxmlformats.org/presentationml/2006/main">
+  <p:cSld>
+    <p:spTree>
+      <p:nvGrpSpPr>
+        <p:cNvPr id="1" name=""/>
+        <p:cNvGrpSpPr/>
+        <p:nvPr/>
+      </p:nvGrpSpPr>
+      <p:grpSpPr>
+        <a:xfrm>
+          <a:off x="0" y="0"/>
+          <a:ext cx="0" cy="0"/>
+          <a:chOff x="0" y="0"/>
+          <a:chExt cx="0" cy="0"/>
+        </a:xfrm>
+      </p:grpSpPr>
+      <p:sp>
+        <p:nvSpPr>
+          <p:cNvPr id="2" name="Title 1"/>
+          <p:cNvSpPr>
+            <a:spLocks noGrp="1"/>
+          </p:cNvSpPr>
+          <p:nvPr>
+            <p:ph type="title"/>
+          </p:nvPr>
+        </p:nvSpPr>
+        <p:spPr/>
+        <p:txBody>
+          <a:bodyPr/>
+          <a:lstStyle/>
+          <a:p>
+            <a:r>
+              <a:rPr lang="ja-JP" altLang="en-US" dirty="0" smtClean="0"/>
+              <a:t>ラボユースで学んだこと</a:t>
+            </a:r>
+            <a:endParaRPr lang="en-US" dirty="0"/>
+          </a:p>
+        </p:txBody>
+      </p:sp>
+      <p:sp>
+        <p:nvSpPr>
+          <p:cNvPr id="3" name="Content Placeholder 2"/>
+          <p:cNvSpPr>
+            <a:spLocks noGrp="1"/>
+          </p:cNvSpPr>
+          <p:nvPr>
+            <p:ph idx="1"/>
+          </p:nvPr>
+        </p:nvSpPr>
+        <p:spPr/>
+        <p:txBody>
+          <a:bodyPr/>
+          <a:lstStyle/>
+          <a:p>
+            <a:endParaRPr lang="en-US"/>
+          </a:p>
+        </p:txBody>
+      </p:sp>
+      <p:sp>
+        <p:nvSpPr>
+          <p:cNvPr id="4" name="Date Placeholder 3"/>
+          <p:cNvSpPr>
+            <a:spLocks noGrp="1"/>
+          </p:cNvSpPr>
+          <p:nvPr>
+            <p:ph type="dt" sz="half" idx="10"/>
+          </p:nvPr>
+        </p:nvSpPr>
+        <p:spPr/>
+        <p:txBody>
+          <a:bodyPr/>
+          <a:lstStyle/>
+          <a:p>
+            <a:r>
+              <a:rPr lang="x-none" smtClean="0"/>
+              <a:t>3/30/16</a:t>
+            </a:r>
+            <a:endParaRPr lang="en-US"/>
+          </a:p>
+        </p:txBody>
+      </p:sp>
+      <p:sp>
+        <p:nvSpPr>
+          <p:cNvPr id="5" name="Footer Placeholder 4"/>
+          <p:cNvSpPr>
+            <a:spLocks noGrp="1"/>
+          </p:cNvSpPr>
+          <p:nvPr>
+            <p:ph type="ftr" sz="quarter" idx="11"/>
+          </p:nvPr>
+        </p:nvSpPr>
+        <p:spPr/>
+        <p:txBody>
+          <a:bodyPr/>
+          <a:lstStyle/>
+          <a:p>
+            <a:r>
+              <a:rPr lang="ja-JP" altLang="en-US" smtClean="0"/>
+              <a:t>サイボウズ・ラボユース成果報告会</a:t>
+            </a:r>
+            <a:endParaRPr lang="en-US"/>
+          </a:p>
+        </p:txBody>
+      </p:sp>
+      <p:sp>
+        <p:nvSpPr>
+          <p:cNvPr id="6" name="Slide Number Placeholder 5"/>
+          <p:cNvSpPr>
+            <a:spLocks noGrp="1"/>
+          </p:cNvSpPr>
+          <p:nvPr>
+            <p:ph type="sldNum" sz="quarter" idx="12"/>
+          </p:nvPr>
+        </p:nvSpPr>
+        <p:spPr/>
+        <p:txBody>
+          <a:bodyPr/>
+          <a:lstStyle/>
+          <a:p>
+            <a:fld id="{CC15D400-9C14-254D-84D7-AF2EB5526E40}" type="slidenum">
+              <a:rPr lang="en-US" smtClean="0"/>
+              <a:t>14</a:t>
+            </a:fld>
+            <a:endParaRPr lang="en-US"/>
+          </a:p>
+        </p:txBody>
+      </p:sp>
+    </p:spTree>
+    <p:extLst>
+      <p:ext uri="{BB962C8B-B14F-4D97-AF65-F5344CB8AC3E}">
+        <p14:creationId xmlns:p14="http://schemas.microsoft.com/office/powerpoint/2010/main" val="541211048"/>
+      </p:ext>
+    </p:extLst>
+  </p:cSld>
+  <p:clrMapOvr>
+    <a:masterClrMapping/>
+  </p:clrMapOvr>
+  <p:timing>
+    <p:tnLst>
+      <p:par>
+        <p:cTn id="1" dur="indefinite" restart="never" nodeType="tmRoot"/>
+      </p:par>
+    </p:tnLst>
+  </p:timing>
 </p:sld>
 </file>
 
@@ -4579,8 +5383,8 @@
           <a:lstStyle/>
           <a:p>
             <a:r>
-              <a:rPr lang="en-US" dirty="0" smtClean="0"/>
-              <a:t>Agenda</a:t>
+              <a:rPr lang="ja-JP" altLang="en-US" dirty="0" smtClean="0"/>
+              <a:t>自己紹介</a:t>
             </a:r>
             <a:endParaRPr lang="en-US" dirty="0"/>
           </a:p>
@@ -4602,44 +5406,136 @@
           <a:lstStyle/>
           <a:p>
             <a:r>
+              <a:rPr lang="ja-JP" altLang="en-US" dirty="0" smtClean="0"/>
+              <a:t>本名</a:t>
+            </a:r>
+            <a:r>
+              <a:rPr lang="en-US" altLang="ja-JP" dirty="0" smtClean="0"/>
+              <a:t>: </a:t>
+            </a:r>
+            <a:r>
+              <a:rPr lang="ja-JP" altLang="en-US" dirty="0" smtClean="0"/>
+              <a:t>城倉</a:t>
+            </a:r>
+            <a:r>
+              <a:rPr lang="en-US" altLang="ja-JP" dirty="0" smtClean="0"/>
+              <a:t> </a:t>
+            </a:r>
+            <a:r>
+              <a:rPr lang="ja-JP" altLang="en-US" dirty="0" smtClean="0"/>
+              <a:t>弘樹</a:t>
+            </a:r>
+            <a:r>
+              <a:rPr lang="en-US" altLang="ja-JP" dirty="0" smtClean="0"/>
+              <a:t> (</a:t>
+            </a:r>
+            <a:r>
+              <a:rPr lang="ja-JP" altLang="en-US" dirty="0" smtClean="0"/>
+              <a:t>しろくら</a:t>
+            </a:r>
+            <a:r>
+              <a:rPr lang="en-US" altLang="ja-JP" dirty="0" smtClean="0"/>
+              <a:t> </a:t>
+            </a:r>
+            <a:r>
+              <a:rPr lang="ja-JP" altLang="en-US" dirty="0" smtClean="0"/>
+              <a:t>ひろき</a:t>
+            </a:r>
+            <a:r>
+              <a:rPr lang="en-US" altLang="ja-JP" dirty="0" smtClean="0"/>
+              <a:t>)</a:t>
+            </a:r>
+          </a:p>
+          <a:p>
+            <a:r>
               <a:rPr lang="ja-JP" altLang="en-US" dirty="0"/>
-              <a:t>サイボウズラボユースでのとりくみ</a:t>
-            </a:r>
-            <a:endParaRPr lang="en-US" altLang="ja-JP" dirty="0"/>
-          </a:p>
-          <a:p>
-            <a:pPr lvl="1"/>
+              <a:t>法政大学理工学部</a:t>
+            </a:r>
             <a:r>
               <a:rPr lang="en-US" altLang="ja-JP" dirty="0"/>
-              <a:t>LibPGEN</a:t>
+              <a:t> </a:t>
             </a:r>
             <a:r>
               <a:rPr lang="ja-JP" altLang="en-US" dirty="0"/>
-              <a:t>について</a:t>
-            </a:r>
-          </a:p>
-          <a:p>
-            <a:pPr lvl="1"/>
+              <a:t>新</a:t>
+            </a:r>
+            <a:r>
+              <a:rPr lang="en-US" altLang="ja-JP" dirty="0"/>
+              <a:t>3</a:t>
+            </a:r>
             <a:r>
               <a:rPr lang="ja-JP" altLang="en-US" dirty="0"/>
-              <a:t>デモ</a:t>
-            </a:r>
-          </a:p>
-          <a:p>
-            <a:r>
-              <a:rPr lang="ja-JP" altLang="en-US" dirty="0"/>
-              <a:t>今後について</a:t>
-            </a:r>
-          </a:p>
-          <a:p>
-            <a:pPr lvl="1"/>
-            <a:r>
-              <a:rPr lang="ja-JP" altLang="en-US" dirty="0"/>
-              <a:t>開発を通じて</a:t>
-            </a:r>
-          </a:p>
-          <a:p>
-            <a:endParaRPr lang="en-US" dirty="0"/>
+              <a:t>年</a:t>
+            </a:r>
+          </a:p>
+          <a:p>
+            <a:r>
+              <a:rPr lang="en-US" altLang="ja-JP" dirty="0" smtClean="0"/>
+              <a:t>Twitter: @slankdev</a:t>
+            </a:r>
+          </a:p>
+          <a:p>
+            <a:r>
+              <a:rPr lang="en-US" altLang="ja-JP" dirty="0" err="1" smtClean="0"/>
+              <a:t>GitHub</a:t>
+            </a:r>
+            <a:r>
+              <a:rPr lang="en-US" altLang="ja-JP" dirty="0" smtClean="0"/>
+              <a:t>:  slankdev</a:t>
+            </a:r>
+            <a:endParaRPr lang="ja-JP" altLang="en-US" dirty="0" smtClean="0"/>
+          </a:p>
+          <a:p>
+            <a:r>
+              <a:rPr lang="ja-JP" altLang="en-US" dirty="0" smtClean="0"/>
+              <a:t>サイボウズ・ラボユース第</a:t>
+            </a:r>
+            <a:r>
+              <a:rPr lang="en-US" altLang="ja-JP" dirty="0" smtClean="0"/>
+              <a:t>5</a:t>
+            </a:r>
+            <a:r>
+              <a:rPr lang="ja-JP" altLang="en-US" dirty="0" smtClean="0"/>
+              <a:t>期生</a:t>
+            </a:r>
+            <a:br>
+              <a:rPr lang="ja-JP" altLang="en-US" dirty="0" smtClean="0"/>
+            </a:br>
+            <a:r>
+              <a:rPr lang="en-US" altLang="ja-JP" dirty="0" smtClean="0"/>
+              <a:t>  (</a:t>
+            </a:r>
+            <a:r>
+              <a:rPr lang="ja-JP" altLang="en-US" dirty="0" smtClean="0"/>
+              <a:t>第</a:t>
+            </a:r>
+            <a:r>
+              <a:rPr lang="en-US" altLang="ja-JP" dirty="0" smtClean="0"/>
+              <a:t>6</a:t>
+            </a:r>
+            <a:r>
+              <a:rPr lang="ja-JP" altLang="en-US" dirty="0" smtClean="0"/>
+              <a:t>期もお世話になります</a:t>
+            </a:r>
+            <a:r>
+              <a:rPr lang="en-US" altLang="ja-JP" dirty="0" smtClean="0"/>
+              <a:t>)</a:t>
+            </a:r>
+          </a:p>
+          <a:p>
+            <a:r>
+              <a:rPr lang="ja-JP" altLang="en-US" dirty="0" smtClean="0"/>
+              <a:t>セキュリティ・キャンプ</a:t>
+            </a:r>
+            <a:r>
+              <a:rPr lang="en-US" altLang="ja-JP" dirty="0" smtClean="0"/>
+              <a:t> 2015 </a:t>
+            </a:r>
+            <a:r>
+              <a:rPr lang="ja-JP" altLang="en-US" dirty="0" smtClean="0"/>
+              <a:t>修了生</a:t>
+            </a:r>
+            <a:endParaRPr lang="ja-JP" altLang="en-US" dirty="0" smtClean="0"/>
           </a:p>
         </p:txBody>
       </p:sp>
@@ -4659,7 +5555,7 @@
           <a:lstStyle/>
           <a:p>
             <a:r>
-              <a:rPr lang="Zyyy" smtClean="0"/>
+              <a:rPr lang="x-none" smtClean="0"/>
               <a:t>3/30/16</a:t>
             </a:r>
             <a:endParaRPr lang="en-US"/>
@@ -4715,13 +5611,20 @@
     </p:spTree>
     <p:extLst>
       <p:ext uri="{BB962C8B-B14F-4D97-AF65-F5344CB8AC3E}">
-        <p14:creationId xmlns:p14="http://schemas.microsoft.com/office/powerpoint/2010/main" val="1385275772"/>
+        <p14:creationId xmlns:p14="http://schemas.microsoft.com/office/powerpoint/2010/main" val="350292880"/>
       </p:ext>
     </p:extLst>
   </p:cSld>
   <p:clrMapOvr>
     <a:masterClrMapping/>
   </p:clrMapOvr>
+  <p:timing>
+    <p:tnLst>
+      <p:par>
+        <p:cTn id="1" dur="indefinite" restart="never" nodeType="tmRoot"/>
+      </p:par>
+    </p:tnLst>
+  </p:timing>
 </p:sld>
 </file>
 
@@ -4759,38 +5662,7 @@
           <a:p>
             <a:r>
               <a:rPr lang="ja-JP" altLang="en-US" dirty="0" smtClean="0"/>
-              <a:t>自己紹介</a:t>
-            </a:r>
-            <a:endParaRPr lang="en-US" dirty="0"/>
-          </a:p>
-        </p:txBody>
-      </p:sp>
-      <p:sp>
-        <p:nvSpPr>
-          <p:cNvPr id="3" name="Content Placeholder 2"/>
-          <p:cNvSpPr>
-            <a:spLocks noGrp="1"/>
-          </p:cNvSpPr>
-          <p:nvPr>
-            <p:ph idx="1"/>
-          </p:nvPr>
-        </p:nvSpPr>
-        <p:spPr/>
-        <p:txBody>
-          <a:bodyPr/>
-          <a:lstStyle/>
-          <a:p>
-            <a:r>
-              <a:rPr lang="ja-JP" altLang="en-US" dirty="0" smtClean="0"/>
-              <a:t>本名</a:t>
-            </a:r>
-            <a:r>
-              <a:rPr lang="en-US" altLang="ja-JP" dirty="0" smtClean="0"/>
-              <a:t>: </a:t>
-            </a:r>
-            <a:r>
-              <a:rPr lang="ja-JP" altLang="en-US" dirty="0" smtClean="0"/>
-              <a:t>城倉</a:t>
+              <a:t>サイボウズ・ラボユース</a:t>
             </a:r>
             <a:r>
               <a:rPr lang="en-US" altLang="ja-JP" dirty="0" smtClean="0"/>
@@ -4798,79 +5670,148 @@
             </a:r>
             <a:r>
               <a:rPr lang="ja-JP" altLang="en-US" dirty="0" smtClean="0"/>
-              <a:t>弘樹</a:t>
+              <a:t>第</a:t>
             </a:r>
             <a:r>
               <a:rPr lang="en-US" altLang="ja-JP" dirty="0" smtClean="0"/>
-              <a:t> (</a:t>
+              <a:t>5</a:t>
             </a:r>
             <a:r>
               <a:rPr lang="ja-JP" altLang="en-US" dirty="0" smtClean="0"/>
-              <a:t>しろくら</a:t>
-            </a:r>
-            <a:r>
-              <a:rPr lang="en-US" altLang="ja-JP" dirty="0" smtClean="0"/>
-              <a:t> </a:t>
-            </a:r>
+              <a:t>期</a:t>
+            </a:r>
+            <a:endParaRPr lang="en-US" dirty="0"/>
+          </a:p>
+        </p:txBody>
+      </p:sp>
+      <p:sp>
+        <p:nvSpPr>
+          <p:cNvPr id="3" name="Content Placeholder 2"/>
+          <p:cNvSpPr>
+            <a:spLocks noGrp="1"/>
+          </p:cNvSpPr>
+          <p:nvPr>
+            <p:ph idx="1"/>
+          </p:nvPr>
+        </p:nvSpPr>
+        <p:spPr/>
+        <p:txBody>
+          <a:bodyPr/>
+          <a:lstStyle/>
+          <a:p>
             <a:r>
               <a:rPr lang="ja-JP" altLang="en-US" dirty="0" smtClean="0"/>
-              <a:t>ひろき</a:t>
-            </a:r>
-            <a:r>
-              <a:rPr lang="en-US" altLang="ja-JP" dirty="0" smtClean="0"/>
-              <a:t>)</a:t>
-            </a:r>
-            <a:endParaRPr lang="ja-JP" altLang="en-US" dirty="0" smtClean="0"/>
-          </a:p>
-          <a:p>
-            <a:r>
-              <a:rPr lang="ja-JP" altLang="en-US" dirty="0" smtClean="0"/>
-              <a:t>法政大学理工学部</a:t>
-            </a:r>
-            <a:r>
-              <a:rPr lang="en-US" altLang="ja-JP" dirty="0" smtClean="0"/>
-              <a:t> </a:t>
-            </a:r>
-            <a:r>
-              <a:rPr lang="ja-JP" altLang="en-US" dirty="0" smtClean="0"/>
-              <a:t>新</a:t>
-            </a:r>
-            <a:r>
-              <a:rPr lang="en-US" altLang="ja-JP" dirty="0" smtClean="0"/>
-              <a:t>3</a:t>
-            </a:r>
-            <a:r>
-              <a:rPr lang="ja-JP" altLang="en-US" dirty="0" smtClean="0"/>
-              <a:t>年</a:t>
-            </a:r>
-          </a:p>
-          <a:p>
+              <a:t>活動内容</a:t>
+            </a:r>
+            <a:endParaRPr lang="en-US" altLang="ja-JP" dirty="0" smtClean="0"/>
+          </a:p>
+          <a:p>
+            <a:pPr lvl="1"/>
             <a:r>
               <a:rPr lang="ja-JP" altLang="en-US" dirty="0" smtClean="0"/>
               <a:t>開発テーマ</a:t>
             </a:r>
             <a:r>
               <a:rPr lang="en-US" altLang="ja-JP" dirty="0" smtClean="0"/>
-              <a:t>: </a:t>
+              <a:t>: C/C++</a:t>
             </a:r>
             <a:r>
               <a:rPr lang="ja-JP" altLang="en-US" dirty="0" smtClean="0"/>
-              <a:t>「」</a:t>
-            </a:r>
-          </a:p>
-          <a:p>
+              <a:t>によるソフトウェア開発</a:t>
+            </a:r>
+          </a:p>
+          <a:p>
+            <a:pPr lvl="1"/>
             <a:r>
               <a:rPr lang="ja-JP" altLang="en-US" dirty="0" smtClean="0"/>
               <a:t>メンター</a:t>
             </a:r>
             <a:r>
-              <a:rPr lang="en-US" altLang="ja-JP" dirty="0" smtClean="0"/>
-              <a:t>:  </a:t>
-            </a:r>
-            <a:r>
-              <a:rPr lang="ja-JP" altLang="en-US" dirty="0" smtClean="0"/>
-              <a:t>光成さん</a:t>
-            </a:r>
+              <a:rPr lang="en-US" altLang="ja-JP" dirty="0">
+                <a:latin typeface="+mn-ea"/>
+              </a:rPr>
+              <a:t>: </a:t>
+            </a:r>
+            <a:r>
+              <a:rPr lang="zh-CN" altLang="en-US" dirty="0">
+                <a:latin typeface="MS PGothic" charset="-128"/>
+                <a:ea typeface="MS PGothic" charset="-128"/>
+                <a:cs typeface="MS PGothic" charset="-128"/>
+              </a:rPr>
+              <a:t>光成 </a:t>
+            </a:r>
+            <a:r>
+              <a:rPr lang="zh-CN" altLang="en-US" dirty="0" smtClean="0">
+                <a:latin typeface="MS PGothic" charset="-128"/>
+                <a:ea typeface="MS PGothic" charset="-128"/>
+                <a:cs typeface="MS PGothic" charset="-128"/>
+              </a:rPr>
+              <a:t>滋生</a:t>
+            </a:r>
+            <a:endParaRPr lang="ja-JP" altLang="en-US" dirty="0" smtClean="0">
+              <a:latin typeface="MS PGothic" charset="-128"/>
+              <a:ea typeface="MS PGothic" charset="-128"/>
+              <a:cs typeface="MS PGothic" charset="-128"/>
+            </a:endParaRPr>
+          </a:p>
+          <a:p>
+            <a:r>
+              <a:rPr lang="en-US" dirty="0" smtClean="0">
+                <a:latin typeface="MS PGothic" charset="-128"/>
+                <a:ea typeface="MS PGothic" charset="-128"/>
+                <a:cs typeface="MS PGothic" charset="-128"/>
+              </a:rPr>
+              <a:t>LibPGEN</a:t>
+            </a:r>
+            <a:r>
+              <a:rPr lang="ja-JP" altLang="en-US" dirty="0" smtClean="0">
+                <a:latin typeface="MS PGothic" charset="-128"/>
+                <a:ea typeface="MS PGothic" charset="-128"/>
+                <a:cs typeface="MS PGothic" charset="-128"/>
+              </a:rPr>
+              <a:t>を開発</a:t>
+            </a:r>
+          </a:p>
+          <a:p>
+            <a:pPr lvl="1"/>
+            <a:r>
+              <a:rPr lang="ja-JP" altLang="en-US" dirty="0" smtClean="0">
+                <a:latin typeface="MS PGothic" charset="-128"/>
+                <a:ea typeface="MS PGothic" charset="-128"/>
+                <a:cs typeface="MS PGothic" charset="-128"/>
+              </a:rPr>
+              <a:t>りぶぴーじぇんと読みます</a:t>
+            </a:r>
+          </a:p>
+          <a:p>
+            <a:pPr lvl="1"/>
+            <a:r>
+              <a:rPr lang="ja-JP" altLang="en-US" dirty="0" smtClean="0">
+                <a:latin typeface="MS PGothic" charset="-128"/>
+                <a:ea typeface="MS PGothic" charset="-128"/>
+                <a:cs typeface="MS PGothic" charset="-128"/>
+              </a:rPr>
+              <a:t>パケット操作のライブラリ</a:t>
+            </a:r>
+          </a:p>
+          <a:p>
+            <a:pPr lvl="1"/>
+            <a:r>
+              <a:rPr lang="en-US" dirty="0" smtClean="0">
+                <a:latin typeface="MS PGothic" charset="-128"/>
+                <a:ea typeface="MS PGothic" charset="-128"/>
+                <a:cs typeface="MS PGothic" charset="-128"/>
+                <a:hlinkClick r:id="rId2"/>
+              </a:rPr>
+              <a:t>https://github.com/slankdev/libpgen</a:t>
+            </a:r>
+            <a:endParaRPr lang="en-US" dirty="0" smtClean="0">
+              <a:latin typeface="MS PGothic" charset="-128"/>
+              <a:ea typeface="MS PGothic" charset="-128"/>
+              <a:cs typeface="MS PGothic" charset="-128"/>
+            </a:endParaRPr>
+          </a:p>
+          <a:p>
             <a:endParaRPr lang="en-US" dirty="0"/>
           </a:p>
         </p:txBody>
@@ -4891,7 +5832,7 @@
           <a:lstStyle/>
           <a:p>
             <a:r>
-              <a:rPr lang="Zyyy" smtClean="0"/>
+              <a:rPr lang="x-none" smtClean="0"/>
               <a:t>3/30/16</a:t>
             </a:r>
             <a:endParaRPr lang="en-US"/>
@@ -4947,13 +5888,1176 @@
     </p:spTree>
     <p:extLst>
       <p:ext uri="{BB962C8B-B14F-4D97-AF65-F5344CB8AC3E}">
-        <p14:creationId xmlns:p14="http://schemas.microsoft.com/office/powerpoint/2010/main" val="350292880"/>
+        <p14:creationId xmlns:p14="http://schemas.microsoft.com/office/powerpoint/2010/main" val="431579663"/>
       </p:ext>
     </p:extLst>
   </p:cSld>
   <p:clrMapOvr>
     <a:masterClrMapping/>
   </p:clrMapOvr>
+  <p:timing>
+    <p:tnLst>
+      <p:par>
+        <p:cTn id="1" dur="indefinite" restart="never" nodeType="tmRoot"/>
+      </p:par>
+    </p:tnLst>
+  </p:timing>
+</p:sld>
+</file>
+
+<file path=ppt/slides/slide4.xml><?xml version="1.0" encoding="utf-8"?>
+<p:sld xmlns:a="http://schemas.openxmlformats.org/drawingml/2006/main" xmlns:r="http://schemas.openxmlformats.org/officeDocument/2006/relationships" xmlns:p="http://schemas.openxmlformats.org/presentationml/2006/main">
+  <p:cSld>
+    <p:spTree>
+      <p:nvGrpSpPr>
+        <p:cNvPr id="1" name=""/>
+        <p:cNvGrpSpPr/>
+        <p:nvPr/>
+      </p:nvGrpSpPr>
+      <p:grpSpPr>
+        <a:xfrm>
+          <a:off x="0" y="0"/>
+          <a:ext cx="0" cy="0"/>
+          <a:chOff x="0" y="0"/>
+          <a:chExt cx="0" cy="0"/>
+        </a:xfrm>
+      </p:grpSpPr>
+      <p:sp>
+        <p:nvSpPr>
+          <p:cNvPr id="2" name="Title 1"/>
+          <p:cNvSpPr>
+            <a:spLocks noGrp="1"/>
+          </p:cNvSpPr>
+          <p:nvPr>
+            <p:ph type="title"/>
+          </p:nvPr>
+        </p:nvSpPr>
+        <p:spPr/>
+        <p:txBody>
+          <a:bodyPr/>
+          <a:lstStyle/>
+          <a:p>
+            <a:r>
+              <a:rPr lang="ja-JP" altLang="en-US" dirty="0" smtClean="0"/>
+              <a:t>注意</a:t>
+            </a:r>
+            <a:endParaRPr lang="en-US" dirty="0"/>
+          </a:p>
+        </p:txBody>
+      </p:sp>
+      <p:sp>
+        <p:nvSpPr>
+          <p:cNvPr id="3" name="Content Placeholder 2"/>
+          <p:cNvSpPr>
+            <a:spLocks noGrp="1"/>
+          </p:cNvSpPr>
+          <p:nvPr>
+            <p:ph idx="1"/>
+          </p:nvPr>
+        </p:nvSpPr>
+        <p:spPr/>
+        <p:txBody>
+          <a:bodyPr/>
+          <a:lstStyle/>
+          <a:p>
+            <a:r>
+              <a:rPr lang="ja-JP" altLang="en-US" dirty="0" smtClean="0"/>
+              <a:t>今年の</a:t>
+            </a:r>
+            <a:r>
+              <a:rPr lang="en-US" altLang="ja-JP" dirty="0" smtClean="0"/>
+              <a:t>2</a:t>
+            </a:r>
+            <a:r>
+              <a:rPr lang="ja-JP" altLang="en-US" dirty="0" smtClean="0"/>
+              <a:t>月からラボユースを始めたため、まだ完成段階ではありませんので中間報告のような形になっています。</a:t>
+            </a:r>
+          </a:p>
+          <a:p>
+            <a:r>
+              <a:rPr lang="ja-JP" altLang="en-US" dirty="0" smtClean="0"/>
+              <a:t>何卒ご理解ください</a:t>
+            </a:r>
+            <a:endParaRPr lang="en-US" dirty="0"/>
+          </a:p>
+        </p:txBody>
+      </p:sp>
+      <p:sp>
+        <p:nvSpPr>
+          <p:cNvPr id="4" name="Date Placeholder 3"/>
+          <p:cNvSpPr>
+            <a:spLocks noGrp="1"/>
+          </p:cNvSpPr>
+          <p:nvPr>
+            <p:ph type="dt" sz="half" idx="10"/>
+          </p:nvPr>
+        </p:nvSpPr>
+        <p:spPr/>
+        <p:txBody>
+          <a:bodyPr/>
+          <a:lstStyle/>
+          <a:p>
+            <a:r>
+              <a:rPr lang="x-none" smtClean="0"/>
+              <a:t>3/30/16</a:t>
+            </a:r>
+            <a:endParaRPr lang="en-US"/>
+          </a:p>
+        </p:txBody>
+      </p:sp>
+      <p:sp>
+        <p:nvSpPr>
+          <p:cNvPr id="5" name="Footer Placeholder 4"/>
+          <p:cNvSpPr>
+            <a:spLocks noGrp="1"/>
+          </p:cNvSpPr>
+          <p:nvPr>
+            <p:ph type="ftr" sz="quarter" idx="11"/>
+          </p:nvPr>
+        </p:nvSpPr>
+        <p:spPr/>
+        <p:txBody>
+          <a:bodyPr/>
+          <a:lstStyle/>
+          <a:p>
+            <a:r>
+              <a:rPr lang="ja-JP" altLang="en-US" smtClean="0"/>
+              <a:t>サイボウズ・ラボユース成果報告会</a:t>
+            </a:r>
+            <a:endParaRPr lang="en-US"/>
+          </a:p>
+        </p:txBody>
+      </p:sp>
+      <p:sp>
+        <p:nvSpPr>
+          <p:cNvPr id="6" name="Slide Number Placeholder 5"/>
+          <p:cNvSpPr>
+            <a:spLocks noGrp="1"/>
+          </p:cNvSpPr>
+          <p:nvPr>
+            <p:ph type="sldNum" sz="quarter" idx="12"/>
+          </p:nvPr>
+        </p:nvSpPr>
+        <p:spPr/>
+        <p:txBody>
+          <a:bodyPr/>
+          <a:lstStyle/>
+          <a:p>
+            <a:fld id="{CC15D400-9C14-254D-84D7-AF2EB5526E40}" type="slidenum">
+              <a:rPr lang="en-US" smtClean="0"/>
+              <a:t>4</a:t>
+            </a:fld>
+            <a:endParaRPr lang="en-US"/>
+          </a:p>
+        </p:txBody>
+      </p:sp>
+    </p:spTree>
+    <p:extLst>
+      <p:ext uri="{BB962C8B-B14F-4D97-AF65-F5344CB8AC3E}">
+        <p14:creationId xmlns:p14="http://schemas.microsoft.com/office/powerpoint/2010/main" val="901747874"/>
+      </p:ext>
+    </p:extLst>
+  </p:cSld>
+  <p:clrMapOvr>
+    <a:masterClrMapping/>
+  </p:clrMapOvr>
+  <p:timing>
+    <p:tnLst>
+      <p:par>
+        <p:cTn id="1" dur="indefinite" restart="never" nodeType="tmRoot"/>
+      </p:par>
+    </p:tnLst>
+  </p:timing>
+</p:sld>
+</file>
+
+<file path=ppt/slides/slide5.xml><?xml version="1.0" encoding="utf-8"?>
+<p:sld xmlns:a="http://schemas.openxmlformats.org/drawingml/2006/main" xmlns:r="http://schemas.openxmlformats.org/officeDocument/2006/relationships" xmlns:p="http://schemas.openxmlformats.org/presentationml/2006/main">
+  <p:cSld>
+    <p:spTree>
+      <p:nvGrpSpPr>
+        <p:cNvPr id="1" name=""/>
+        <p:cNvGrpSpPr/>
+        <p:nvPr/>
+      </p:nvGrpSpPr>
+      <p:grpSpPr>
+        <a:xfrm>
+          <a:off x="0" y="0"/>
+          <a:ext cx="0" cy="0"/>
+          <a:chOff x="0" y="0"/>
+          <a:chExt cx="0" cy="0"/>
+        </a:xfrm>
+      </p:grpSpPr>
+      <p:sp>
+        <p:nvSpPr>
+          <p:cNvPr id="2" name="Title 1"/>
+          <p:cNvSpPr>
+            <a:spLocks noGrp="1"/>
+          </p:cNvSpPr>
+          <p:nvPr>
+            <p:ph type="title"/>
+          </p:nvPr>
+        </p:nvSpPr>
+        <p:spPr/>
+        <p:txBody>
+          <a:bodyPr/>
+          <a:lstStyle/>
+          <a:p>
+            <a:r>
+              <a:rPr lang="en-US" dirty="0" smtClean="0"/>
+              <a:t>Agenda</a:t>
+            </a:r>
+            <a:endParaRPr lang="en-US" dirty="0"/>
+          </a:p>
+        </p:txBody>
+      </p:sp>
+      <p:sp>
+        <p:nvSpPr>
+          <p:cNvPr id="3" name="Content Placeholder 2"/>
+          <p:cNvSpPr>
+            <a:spLocks noGrp="1"/>
+          </p:cNvSpPr>
+          <p:nvPr>
+            <p:ph idx="1"/>
+          </p:nvPr>
+        </p:nvSpPr>
+        <p:spPr/>
+        <p:txBody>
+          <a:bodyPr/>
+          <a:lstStyle/>
+          <a:p>
+            <a:r>
+              <a:rPr lang="en-US" altLang="ja-JP" dirty="0" smtClean="0"/>
+              <a:t>LibPGEN</a:t>
+            </a:r>
+            <a:r>
+              <a:rPr lang="ja-JP" altLang="en-US" dirty="0" smtClean="0"/>
+              <a:t>について</a:t>
+            </a:r>
+          </a:p>
+          <a:p>
+            <a:pPr lvl="1"/>
+            <a:r>
+              <a:rPr lang="en-US" altLang="ja-JP" dirty="0" smtClean="0"/>
+              <a:t>LibPGEN</a:t>
+            </a:r>
+            <a:r>
+              <a:rPr lang="ja-JP" altLang="en-US" dirty="0" smtClean="0"/>
+              <a:t>とは</a:t>
+            </a:r>
+            <a:endParaRPr lang="en-US" altLang="ja-JP" dirty="0" smtClean="0"/>
+          </a:p>
+          <a:p>
+            <a:pPr lvl="1"/>
+            <a:r>
+              <a:rPr lang="en-US" altLang="ja-JP" dirty="0" smtClean="0"/>
+              <a:t>LibPGEN</a:t>
+            </a:r>
+            <a:r>
+              <a:rPr lang="ja-JP" altLang="en-US" dirty="0"/>
+              <a:t>の</a:t>
+            </a:r>
+            <a:r>
+              <a:rPr lang="ja-JP" altLang="en-US" dirty="0" smtClean="0"/>
+              <a:t>設計</a:t>
+            </a:r>
+            <a:endParaRPr lang="en-US" altLang="ja-JP" dirty="0" smtClean="0"/>
+          </a:p>
+          <a:p>
+            <a:pPr lvl="1"/>
+            <a:r>
+              <a:rPr lang="en-US" altLang="ja-JP" dirty="0" smtClean="0"/>
+              <a:t>LibPGEN</a:t>
+            </a:r>
+            <a:r>
+              <a:rPr lang="ja-JP" altLang="en-US" dirty="0" smtClean="0"/>
+              <a:t>を</a:t>
+            </a:r>
+            <a:r>
+              <a:rPr lang="ja-JP" altLang="en-US" dirty="0" smtClean="0"/>
+              <a:t>簡単</a:t>
+            </a:r>
+            <a:r>
+              <a:rPr lang="ja-JP" altLang="en-US" dirty="0" smtClean="0"/>
+              <a:t>に</a:t>
+            </a:r>
+            <a:r>
+              <a:rPr lang="ja-JP" altLang="en-US" dirty="0" smtClean="0"/>
+              <a:t>使</a:t>
+            </a:r>
+            <a:r>
+              <a:rPr lang="ja-JP" altLang="en-US" dirty="0" smtClean="0"/>
+              <a:t>う</a:t>
+            </a:r>
+          </a:p>
+          <a:p>
+            <a:pPr lvl="1"/>
+            <a:r>
+              <a:rPr lang="en-US" altLang="ja-JP" dirty="0" smtClean="0"/>
+              <a:t>LibPGEN</a:t>
+            </a:r>
+            <a:r>
+              <a:rPr lang="ja-JP" altLang="en-US" dirty="0" smtClean="0"/>
+              <a:t>の拡張生</a:t>
+            </a:r>
+            <a:r>
+              <a:rPr lang="ja-JP" altLang="en-US" dirty="0" smtClean="0"/>
+              <a:t> </a:t>
+            </a:r>
+            <a:endParaRPr lang="en-US" altLang="ja-JP" dirty="0" smtClean="0"/>
+          </a:p>
+          <a:p>
+            <a:r>
+              <a:rPr lang="ja-JP" altLang="en-US" dirty="0" smtClean="0"/>
+              <a:t>使用例</a:t>
+            </a:r>
+            <a:endParaRPr lang="ja-JP" altLang="en-US" dirty="0" smtClean="0"/>
+          </a:p>
+          <a:p>
+            <a:pPr lvl="1"/>
+            <a:r>
+              <a:rPr lang="en-US" altLang="ja-JP" dirty="0"/>
+              <a:t>ARP</a:t>
+            </a:r>
+            <a:r>
+              <a:rPr lang="ja-JP" altLang="en-US" dirty="0" smtClean="0"/>
+              <a:t>モニタープログラム</a:t>
+            </a:r>
+            <a:endParaRPr lang="en-US" altLang="ja-JP" dirty="0" smtClean="0"/>
+          </a:p>
+          <a:p>
+            <a:pPr lvl="1"/>
+            <a:r>
+              <a:rPr lang="ja-JP" altLang="en-US" dirty="0" smtClean="0"/>
+              <a:t>新た</a:t>
+            </a:r>
+            <a:r>
+              <a:rPr lang="ja-JP" altLang="en-US" dirty="0"/>
+              <a:t>なプロトコルに関するパケット解析</a:t>
+            </a:r>
+            <a:endParaRPr lang="en-US" altLang="ja-JP" dirty="0" smtClean="0"/>
+          </a:p>
+          <a:p>
+            <a:r>
+              <a:rPr lang="ja-JP" altLang="en-US" dirty="0" smtClean="0"/>
+              <a:t>今後</a:t>
+            </a:r>
+            <a:r>
+              <a:rPr lang="ja-JP" altLang="en-US" dirty="0"/>
+              <a:t>の</a:t>
+            </a:r>
+            <a:r>
+              <a:rPr lang="ja-JP" altLang="en-US" dirty="0" smtClean="0"/>
+              <a:t>展開</a:t>
+            </a:r>
+            <a:endParaRPr lang="en-US" altLang="ja-JP" dirty="0" smtClean="0"/>
+          </a:p>
+          <a:p>
+            <a:r>
+              <a:rPr lang="en-US" altLang="ja-JP" dirty="0" smtClean="0"/>
+              <a:t>2</a:t>
+            </a:r>
+            <a:r>
+              <a:rPr lang="ja-JP" altLang="en-US" dirty="0"/>
+              <a:t>ヶ月間がっつり開発をして学んだこと</a:t>
+            </a:r>
+            <a:endParaRPr lang="en-US" dirty="0"/>
+          </a:p>
+        </p:txBody>
+      </p:sp>
+      <p:sp>
+        <p:nvSpPr>
+          <p:cNvPr id="4" name="Date Placeholder 3"/>
+          <p:cNvSpPr>
+            <a:spLocks noGrp="1"/>
+          </p:cNvSpPr>
+          <p:nvPr>
+            <p:ph type="dt" sz="half" idx="10"/>
+          </p:nvPr>
+        </p:nvSpPr>
+        <p:spPr/>
+        <p:txBody>
+          <a:bodyPr/>
+          <a:lstStyle/>
+          <a:p>
+            <a:r>
+              <a:rPr lang="x-none" smtClean="0"/>
+              <a:t>3/30/16</a:t>
+            </a:r>
+            <a:endParaRPr lang="en-US"/>
+          </a:p>
+        </p:txBody>
+      </p:sp>
+      <p:sp>
+        <p:nvSpPr>
+          <p:cNvPr id="5" name="Footer Placeholder 4"/>
+          <p:cNvSpPr>
+            <a:spLocks noGrp="1"/>
+          </p:cNvSpPr>
+          <p:nvPr>
+            <p:ph type="ftr" sz="quarter" idx="11"/>
+          </p:nvPr>
+        </p:nvSpPr>
+        <p:spPr/>
+        <p:txBody>
+          <a:bodyPr/>
+          <a:lstStyle/>
+          <a:p>
+            <a:r>
+              <a:rPr lang="ja-JP" altLang="en-US" smtClean="0"/>
+              <a:t>サイボウズ・ラボユース成果報告会</a:t>
+            </a:r>
+            <a:endParaRPr lang="en-US"/>
+          </a:p>
+        </p:txBody>
+      </p:sp>
+      <p:sp>
+        <p:nvSpPr>
+          <p:cNvPr id="6" name="Slide Number Placeholder 5"/>
+          <p:cNvSpPr>
+            <a:spLocks noGrp="1"/>
+          </p:cNvSpPr>
+          <p:nvPr>
+            <p:ph type="sldNum" sz="quarter" idx="12"/>
+          </p:nvPr>
+        </p:nvSpPr>
+        <p:spPr/>
+        <p:txBody>
+          <a:bodyPr/>
+          <a:lstStyle/>
+          <a:p>
+            <a:fld id="{CC15D400-9C14-254D-84D7-AF2EB5526E40}" type="slidenum">
+              <a:rPr lang="en-US" smtClean="0"/>
+              <a:t>5</a:t>
+            </a:fld>
+            <a:endParaRPr lang="en-US"/>
+          </a:p>
+        </p:txBody>
+      </p:sp>
+    </p:spTree>
+    <p:extLst>
+      <p:ext uri="{BB962C8B-B14F-4D97-AF65-F5344CB8AC3E}">
+        <p14:creationId xmlns:p14="http://schemas.microsoft.com/office/powerpoint/2010/main" val="1385275772"/>
+      </p:ext>
+    </p:extLst>
+  </p:cSld>
+  <p:clrMapOvr>
+    <a:masterClrMapping/>
+  </p:clrMapOvr>
+  <p:timing>
+    <p:tnLst>
+      <p:par>
+        <p:cTn id="1" dur="indefinite" restart="never" nodeType="tmRoot"/>
+      </p:par>
+    </p:tnLst>
+  </p:timing>
+</p:sld>
+</file>
+
+<file path=ppt/slides/slide6.xml><?xml version="1.0" encoding="utf-8"?>
+<p:sld xmlns:a="http://schemas.openxmlformats.org/drawingml/2006/main" xmlns:r="http://schemas.openxmlformats.org/officeDocument/2006/relationships" xmlns:p="http://schemas.openxmlformats.org/presentationml/2006/main">
+  <p:cSld>
+    <p:spTree>
+      <p:nvGrpSpPr>
+        <p:cNvPr id="1" name=""/>
+        <p:cNvGrpSpPr/>
+        <p:nvPr/>
+      </p:nvGrpSpPr>
+      <p:grpSpPr>
+        <a:xfrm>
+          <a:off x="0" y="0"/>
+          <a:ext cx="0" cy="0"/>
+          <a:chOff x="0" y="0"/>
+          <a:chExt cx="0" cy="0"/>
+        </a:xfrm>
+      </p:grpSpPr>
+      <p:sp>
+        <p:nvSpPr>
+          <p:cNvPr id="2" name="Title 1"/>
+          <p:cNvSpPr>
+            <a:spLocks noGrp="1"/>
+          </p:cNvSpPr>
+          <p:nvPr>
+            <p:ph type="title"/>
+          </p:nvPr>
+        </p:nvSpPr>
+        <p:spPr/>
+        <p:txBody>
+          <a:bodyPr/>
+          <a:lstStyle/>
+          <a:p>
+            <a:r>
+              <a:rPr lang="en-US" dirty="0" smtClean="0"/>
+              <a:t>LibPGEN: </a:t>
+            </a:r>
+            <a:r>
+              <a:rPr lang="ja-JP" altLang="en-US" dirty="0" smtClean="0"/>
+              <a:t>と</a:t>
+            </a:r>
+            <a:r>
+              <a:rPr lang="ja-JP" altLang="en-US" dirty="0" smtClean="0"/>
+              <a:t>は</a:t>
+            </a:r>
+            <a:endParaRPr lang="en-US" dirty="0"/>
+          </a:p>
+        </p:txBody>
+      </p:sp>
+      <p:sp>
+        <p:nvSpPr>
+          <p:cNvPr id="3" name="Content Placeholder 2"/>
+          <p:cNvSpPr>
+            <a:spLocks noGrp="1"/>
+          </p:cNvSpPr>
+          <p:nvPr>
+            <p:ph idx="1"/>
+          </p:nvPr>
+        </p:nvSpPr>
+        <p:spPr/>
+        <p:txBody>
+          <a:bodyPr/>
+          <a:lstStyle/>
+          <a:p>
+            <a:r>
+              <a:rPr lang="en-US" dirty="0" smtClean="0"/>
+              <a:t>C++11</a:t>
+            </a:r>
+            <a:r>
+              <a:rPr lang="ja-JP" altLang="en-US" dirty="0" smtClean="0"/>
+              <a:t>で開発しているパケット解析のライブラリ</a:t>
+            </a:r>
+          </a:p>
+          <a:p>
+            <a:r>
+              <a:rPr lang="ja-JP" altLang="en-US" dirty="0" smtClean="0"/>
+              <a:t>パケット解析についてのあらゆる作業をサポート（予定）</a:t>
+            </a:r>
+          </a:p>
+          <a:p>
+            <a:pPr lvl="1"/>
+            <a:r>
+              <a:rPr lang="ja-JP" altLang="en-US" dirty="0" smtClean="0"/>
+              <a:t>新規にパケットを作成</a:t>
+            </a:r>
+          </a:p>
+          <a:p>
+            <a:pPr lvl="1"/>
+            <a:r>
+              <a:rPr lang="ja-JP" altLang="en-US" dirty="0" smtClean="0"/>
+              <a:t>既存のパケットを解析</a:t>
+            </a:r>
+          </a:p>
+          <a:p>
+            <a:pPr lvl="1"/>
+            <a:r>
+              <a:rPr lang="ja-JP" altLang="en-US" dirty="0" smtClean="0"/>
+              <a:t>既存のパケットの一部を変更</a:t>
+            </a:r>
+          </a:p>
+          <a:p>
+            <a:pPr lvl="1"/>
+            <a:r>
+              <a:rPr lang="en-US" altLang="ja-JP" dirty="0" smtClean="0"/>
+              <a:t>NWIF</a:t>
+            </a:r>
+            <a:r>
+              <a:rPr lang="ja-JP" altLang="en-US" dirty="0" smtClean="0"/>
+              <a:t>や </a:t>
+            </a:r>
+            <a:r>
+              <a:rPr lang="en-US" altLang="ja-JP" dirty="0" err="1" smtClean="0"/>
+              <a:t>pcap</a:t>
+            </a:r>
+            <a:r>
+              <a:rPr lang="en-US" altLang="ja-JP" dirty="0" smtClean="0"/>
+              <a:t>, </a:t>
+            </a:r>
+            <a:r>
+              <a:rPr lang="en-US" altLang="ja-JP" dirty="0" err="1" smtClean="0"/>
+              <a:t>pcapng</a:t>
+            </a:r>
+            <a:r>
+              <a:rPr lang="ja-JP" altLang="en-US" dirty="0" smtClean="0"/>
+              <a:t>ファイルにパケットを送受信</a:t>
+            </a:r>
+            <a:endParaRPr lang="en-US" altLang="ja-JP" dirty="0" smtClean="0"/>
+          </a:p>
+          <a:p>
+            <a:r>
+              <a:rPr lang="ja-JP" altLang="en-US" dirty="0" smtClean="0"/>
+              <a:t>拡張がしやすい</a:t>
+            </a:r>
+            <a:r>
+              <a:rPr lang="ja-JP" altLang="en-US" dirty="0" smtClean="0"/>
+              <a:t>設計</a:t>
+            </a:r>
+          </a:p>
+          <a:p>
+            <a:r>
+              <a:rPr lang="ja-JP" altLang="en-US" dirty="0" smtClean="0"/>
+              <a:t>新たなプロトコルに対しての拡張が容易</a:t>
+            </a:r>
+            <a:r>
+              <a:rPr lang="en-US" altLang="ja-JP" dirty="0" smtClean="0"/>
+              <a:t> (</a:t>
+            </a:r>
+            <a:r>
+              <a:rPr lang="ja-JP" altLang="en-US" dirty="0" smtClean="0"/>
+              <a:t>後述</a:t>
+            </a:r>
+            <a:r>
+              <a:rPr lang="en-US" altLang="ja-JP" dirty="0" smtClean="0"/>
+              <a:t>)</a:t>
+            </a:r>
+            <a:endParaRPr lang="en-US" dirty="0"/>
+          </a:p>
+        </p:txBody>
+      </p:sp>
+      <p:sp>
+        <p:nvSpPr>
+          <p:cNvPr id="4" name="Date Placeholder 3"/>
+          <p:cNvSpPr>
+            <a:spLocks noGrp="1"/>
+          </p:cNvSpPr>
+          <p:nvPr>
+            <p:ph type="dt" sz="half" idx="10"/>
+          </p:nvPr>
+        </p:nvSpPr>
+        <p:spPr/>
+        <p:txBody>
+          <a:bodyPr/>
+          <a:lstStyle/>
+          <a:p>
+            <a:r>
+              <a:rPr lang="x-none" smtClean="0"/>
+              <a:t>3/30/16</a:t>
+            </a:r>
+            <a:endParaRPr lang="en-US"/>
+          </a:p>
+        </p:txBody>
+      </p:sp>
+      <p:sp>
+        <p:nvSpPr>
+          <p:cNvPr id="5" name="Footer Placeholder 4"/>
+          <p:cNvSpPr>
+            <a:spLocks noGrp="1"/>
+          </p:cNvSpPr>
+          <p:nvPr>
+            <p:ph type="ftr" sz="quarter" idx="11"/>
+          </p:nvPr>
+        </p:nvSpPr>
+        <p:spPr/>
+        <p:txBody>
+          <a:bodyPr/>
+          <a:lstStyle/>
+          <a:p>
+            <a:r>
+              <a:rPr lang="ja-JP" altLang="en-US" smtClean="0"/>
+              <a:t>サイボウズ・ラボユース成果報告会</a:t>
+            </a:r>
+            <a:endParaRPr lang="en-US"/>
+          </a:p>
+        </p:txBody>
+      </p:sp>
+      <p:sp>
+        <p:nvSpPr>
+          <p:cNvPr id="6" name="Slide Number Placeholder 5"/>
+          <p:cNvSpPr>
+            <a:spLocks noGrp="1"/>
+          </p:cNvSpPr>
+          <p:nvPr>
+            <p:ph type="sldNum" sz="quarter" idx="12"/>
+          </p:nvPr>
+        </p:nvSpPr>
+        <p:spPr/>
+        <p:txBody>
+          <a:bodyPr/>
+          <a:lstStyle/>
+          <a:p>
+            <a:fld id="{CC15D400-9C14-254D-84D7-AF2EB5526E40}" type="slidenum">
+              <a:rPr lang="en-US" smtClean="0"/>
+              <a:t>6</a:t>
+            </a:fld>
+            <a:endParaRPr lang="en-US"/>
+          </a:p>
+        </p:txBody>
+      </p:sp>
+    </p:spTree>
+    <p:extLst>
+      <p:ext uri="{BB962C8B-B14F-4D97-AF65-F5344CB8AC3E}">
+        <p14:creationId xmlns:p14="http://schemas.microsoft.com/office/powerpoint/2010/main" val="1509733760"/>
+      </p:ext>
+    </p:extLst>
+  </p:cSld>
+  <p:clrMapOvr>
+    <a:masterClrMapping/>
+  </p:clrMapOvr>
+  <p:timing>
+    <p:tnLst>
+      <p:par>
+        <p:cTn id="1" dur="indefinite" restart="never" nodeType="tmRoot"/>
+      </p:par>
+    </p:tnLst>
+  </p:timing>
+</p:sld>
+</file>
+
+<file path=ppt/slides/slide7.xml><?xml version="1.0" encoding="utf-8"?>
+<p:sld xmlns:a="http://schemas.openxmlformats.org/drawingml/2006/main" xmlns:r="http://schemas.openxmlformats.org/officeDocument/2006/relationships" xmlns:p="http://schemas.openxmlformats.org/presentationml/2006/main">
+  <p:cSld>
+    <p:spTree>
+      <p:nvGrpSpPr>
+        <p:cNvPr id="1" name=""/>
+        <p:cNvGrpSpPr/>
+        <p:nvPr/>
+      </p:nvGrpSpPr>
+      <p:grpSpPr>
+        <a:xfrm>
+          <a:off x="0" y="0"/>
+          <a:ext cx="0" cy="0"/>
+          <a:chOff x="0" y="0"/>
+          <a:chExt cx="0" cy="0"/>
+        </a:xfrm>
+      </p:grpSpPr>
+      <p:sp>
+        <p:nvSpPr>
+          <p:cNvPr id="2" name="Title 1"/>
+          <p:cNvSpPr>
+            <a:spLocks noGrp="1"/>
+          </p:cNvSpPr>
+          <p:nvPr>
+            <p:ph type="title"/>
+          </p:nvPr>
+        </p:nvSpPr>
+        <p:spPr/>
+        <p:txBody>
+          <a:bodyPr/>
+          <a:lstStyle/>
+          <a:p>
+            <a:r>
+              <a:rPr lang="en-US" dirty="0" smtClean="0"/>
+              <a:t>LibPGEN</a:t>
+            </a:r>
+            <a:r>
+              <a:rPr lang="en-US" dirty="0" smtClean="0"/>
+              <a:t>: </a:t>
+            </a:r>
+            <a:r>
+              <a:rPr lang="ja-JP" altLang="en-US" dirty="0" smtClean="0"/>
+              <a:t>設計</a:t>
+            </a:r>
+            <a:endParaRPr lang="en-US" dirty="0"/>
+          </a:p>
+        </p:txBody>
+      </p:sp>
+      <p:sp>
+        <p:nvSpPr>
+          <p:cNvPr id="3" name="Content Placeholder 2"/>
+          <p:cNvSpPr>
+            <a:spLocks noGrp="1"/>
+          </p:cNvSpPr>
+          <p:nvPr>
+            <p:ph idx="1"/>
+          </p:nvPr>
+        </p:nvSpPr>
+        <p:spPr/>
+        <p:txBody>
+          <a:bodyPr/>
+          <a:lstStyle/>
+          <a:p>
+            <a:endParaRPr lang="en-US"/>
+          </a:p>
+        </p:txBody>
+      </p:sp>
+      <p:sp>
+        <p:nvSpPr>
+          <p:cNvPr id="4" name="Date Placeholder 3"/>
+          <p:cNvSpPr>
+            <a:spLocks noGrp="1"/>
+          </p:cNvSpPr>
+          <p:nvPr>
+            <p:ph type="dt" sz="half" idx="10"/>
+          </p:nvPr>
+        </p:nvSpPr>
+        <p:spPr/>
+        <p:txBody>
+          <a:bodyPr/>
+          <a:lstStyle/>
+          <a:p>
+            <a:r>
+              <a:rPr lang="x-none" smtClean="0"/>
+              <a:t>3/30/16</a:t>
+            </a:r>
+            <a:endParaRPr lang="en-US"/>
+          </a:p>
+        </p:txBody>
+      </p:sp>
+      <p:sp>
+        <p:nvSpPr>
+          <p:cNvPr id="5" name="Footer Placeholder 4"/>
+          <p:cNvSpPr>
+            <a:spLocks noGrp="1"/>
+          </p:cNvSpPr>
+          <p:nvPr>
+            <p:ph type="ftr" sz="quarter" idx="11"/>
+          </p:nvPr>
+        </p:nvSpPr>
+        <p:spPr/>
+        <p:txBody>
+          <a:bodyPr/>
+          <a:lstStyle/>
+          <a:p>
+            <a:r>
+              <a:rPr lang="ja-JP" altLang="en-US" smtClean="0"/>
+              <a:t>サイボウズ・ラボユース成果報告会</a:t>
+            </a:r>
+            <a:endParaRPr lang="en-US"/>
+          </a:p>
+        </p:txBody>
+      </p:sp>
+      <p:sp>
+        <p:nvSpPr>
+          <p:cNvPr id="6" name="Slide Number Placeholder 5"/>
+          <p:cNvSpPr>
+            <a:spLocks noGrp="1"/>
+          </p:cNvSpPr>
+          <p:nvPr>
+            <p:ph type="sldNum" sz="quarter" idx="12"/>
+          </p:nvPr>
+        </p:nvSpPr>
+        <p:spPr/>
+        <p:txBody>
+          <a:bodyPr/>
+          <a:lstStyle/>
+          <a:p>
+            <a:fld id="{CC15D400-9C14-254D-84D7-AF2EB5526E40}" type="slidenum">
+              <a:rPr lang="en-US" smtClean="0"/>
+              <a:t>7</a:t>
+            </a:fld>
+            <a:endParaRPr lang="en-US"/>
+          </a:p>
+        </p:txBody>
+      </p:sp>
+    </p:spTree>
+    <p:extLst>
+      <p:ext uri="{BB962C8B-B14F-4D97-AF65-F5344CB8AC3E}">
+        <p14:creationId xmlns:p14="http://schemas.microsoft.com/office/powerpoint/2010/main" val="475612490"/>
+      </p:ext>
+    </p:extLst>
+  </p:cSld>
+  <p:clrMapOvr>
+    <a:masterClrMapping/>
+  </p:clrMapOvr>
+  <p:timing>
+    <p:tnLst>
+      <p:par>
+        <p:cTn id="1" dur="indefinite" restart="never" nodeType="tmRoot"/>
+      </p:par>
+    </p:tnLst>
+  </p:timing>
+</p:sld>
+</file>
+
+<file path=ppt/slides/slide8.xml><?xml version="1.0" encoding="utf-8"?>
+<p:sld xmlns:a="http://schemas.openxmlformats.org/drawingml/2006/main" xmlns:r="http://schemas.openxmlformats.org/officeDocument/2006/relationships" xmlns:p="http://schemas.openxmlformats.org/presentationml/2006/main">
+  <p:cSld>
+    <p:spTree>
+      <p:nvGrpSpPr>
+        <p:cNvPr id="1" name=""/>
+        <p:cNvGrpSpPr/>
+        <p:nvPr/>
+      </p:nvGrpSpPr>
+      <p:grpSpPr>
+        <a:xfrm>
+          <a:off x="0" y="0"/>
+          <a:ext cx="0" cy="0"/>
+          <a:chOff x="0" y="0"/>
+          <a:chExt cx="0" cy="0"/>
+        </a:xfrm>
+      </p:grpSpPr>
+      <p:sp>
+        <p:nvSpPr>
+          <p:cNvPr id="2" name="Title 1"/>
+          <p:cNvSpPr>
+            <a:spLocks noGrp="1"/>
+          </p:cNvSpPr>
+          <p:nvPr>
+            <p:ph type="title"/>
+          </p:nvPr>
+        </p:nvSpPr>
+        <p:spPr/>
+        <p:txBody>
+          <a:bodyPr/>
+          <a:lstStyle/>
+          <a:p>
+            <a:r>
+              <a:rPr lang="en-US" dirty="0" smtClean="0"/>
+              <a:t>LibPGEN: </a:t>
+            </a:r>
+            <a:r>
+              <a:rPr lang="ja-JP" altLang="en-US" dirty="0" smtClean="0"/>
+              <a:t>簡単に使う</a:t>
+            </a:r>
+            <a:endParaRPr lang="en-US" dirty="0"/>
+          </a:p>
+        </p:txBody>
+      </p:sp>
+      <p:sp>
+        <p:nvSpPr>
+          <p:cNvPr id="3" name="Content Placeholder 2"/>
+          <p:cNvSpPr>
+            <a:spLocks noGrp="1"/>
+          </p:cNvSpPr>
+          <p:nvPr>
+            <p:ph idx="1"/>
+          </p:nvPr>
+        </p:nvSpPr>
+        <p:spPr/>
+        <p:txBody>
+          <a:bodyPr/>
+          <a:lstStyle/>
+          <a:p>
+            <a:endParaRPr lang="en-US"/>
+          </a:p>
+        </p:txBody>
+      </p:sp>
+      <p:sp>
+        <p:nvSpPr>
+          <p:cNvPr id="4" name="Date Placeholder 3"/>
+          <p:cNvSpPr>
+            <a:spLocks noGrp="1"/>
+          </p:cNvSpPr>
+          <p:nvPr>
+            <p:ph type="dt" sz="half" idx="10"/>
+          </p:nvPr>
+        </p:nvSpPr>
+        <p:spPr/>
+        <p:txBody>
+          <a:bodyPr/>
+          <a:lstStyle/>
+          <a:p>
+            <a:r>
+              <a:rPr lang="x-none" smtClean="0"/>
+              <a:t>3/30/16</a:t>
+            </a:r>
+            <a:endParaRPr lang="en-US"/>
+          </a:p>
+        </p:txBody>
+      </p:sp>
+      <p:sp>
+        <p:nvSpPr>
+          <p:cNvPr id="5" name="Footer Placeholder 4"/>
+          <p:cNvSpPr>
+            <a:spLocks noGrp="1"/>
+          </p:cNvSpPr>
+          <p:nvPr>
+            <p:ph type="ftr" sz="quarter" idx="11"/>
+          </p:nvPr>
+        </p:nvSpPr>
+        <p:spPr/>
+        <p:txBody>
+          <a:bodyPr/>
+          <a:lstStyle/>
+          <a:p>
+            <a:r>
+              <a:rPr lang="ja-JP" altLang="en-US" smtClean="0"/>
+              <a:t>サイボウズ・ラボユース成果報告会</a:t>
+            </a:r>
+            <a:endParaRPr lang="en-US"/>
+          </a:p>
+        </p:txBody>
+      </p:sp>
+      <p:sp>
+        <p:nvSpPr>
+          <p:cNvPr id="6" name="Slide Number Placeholder 5"/>
+          <p:cNvSpPr>
+            <a:spLocks noGrp="1"/>
+          </p:cNvSpPr>
+          <p:nvPr>
+            <p:ph type="sldNum" sz="quarter" idx="12"/>
+          </p:nvPr>
+        </p:nvSpPr>
+        <p:spPr/>
+        <p:txBody>
+          <a:bodyPr/>
+          <a:lstStyle/>
+          <a:p>
+            <a:fld id="{CC15D400-9C14-254D-84D7-AF2EB5526E40}" type="slidenum">
+              <a:rPr lang="en-US" smtClean="0"/>
+              <a:t>8</a:t>
+            </a:fld>
+            <a:endParaRPr lang="en-US"/>
+          </a:p>
+        </p:txBody>
+      </p:sp>
+    </p:spTree>
+    <p:extLst>
+      <p:ext uri="{BB962C8B-B14F-4D97-AF65-F5344CB8AC3E}">
+        <p14:creationId xmlns:p14="http://schemas.microsoft.com/office/powerpoint/2010/main" val="720009904"/>
+      </p:ext>
+    </p:extLst>
+  </p:cSld>
+  <p:clrMapOvr>
+    <a:masterClrMapping/>
+  </p:clrMapOvr>
+  <p:timing>
+    <p:tnLst>
+      <p:par>
+        <p:cTn id="1" dur="indefinite" restart="never" nodeType="tmRoot"/>
+      </p:par>
+    </p:tnLst>
+  </p:timing>
+</p:sld>
+</file>
+
+<file path=ppt/slides/slide9.xml><?xml version="1.0" encoding="utf-8"?>
+<p:sld xmlns:a="http://schemas.openxmlformats.org/drawingml/2006/main" xmlns:r="http://schemas.openxmlformats.org/officeDocument/2006/relationships" xmlns:p="http://schemas.openxmlformats.org/presentationml/2006/main">
+  <p:cSld>
+    <p:spTree>
+      <p:nvGrpSpPr>
+        <p:cNvPr id="1" name=""/>
+        <p:cNvGrpSpPr/>
+        <p:nvPr/>
+      </p:nvGrpSpPr>
+      <p:grpSpPr>
+        <a:xfrm>
+          <a:off x="0" y="0"/>
+          <a:ext cx="0" cy="0"/>
+          <a:chOff x="0" y="0"/>
+          <a:chExt cx="0" cy="0"/>
+        </a:xfrm>
+      </p:grpSpPr>
+      <p:sp>
+        <p:nvSpPr>
+          <p:cNvPr id="2" name="Title 1"/>
+          <p:cNvSpPr>
+            <a:spLocks noGrp="1"/>
+          </p:cNvSpPr>
+          <p:nvPr>
+            <p:ph type="title"/>
+          </p:nvPr>
+        </p:nvSpPr>
+        <p:spPr/>
+        <p:txBody>
+          <a:bodyPr/>
+          <a:lstStyle/>
+          <a:p>
+            <a:r>
+              <a:rPr lang="en-US" dirty="0" smtClean="0"/>
+              <a:t>LibPGEN: </a:t>
+            </a:r>
+            <a:r>
+              <a:rPr lang="ja-JP" altLang="en-US" dirty="0" smtClean="0"/>
+              <a:t>拡張性</a:t>
+            </a:r>
+            <a:endParaRPr lang="en-US" dirty="0"/>
+          </a:p>
+        </p:txBody>
+      </p:sp>
+      <p:sp>
+        <p:nvSpPr>
+          <p:cNvPr id="3" name="Content Placeholder 2"/>
+          <p:cNvSpPr>
+            <a:spLocks noGrp="1"/>
+          </p:cNvSpPr>
+          <p:nvPr>
+            <p:ph idx="1"/>
+          </p:nvPr>
+        </p:nvSpPr>
+        <p:spPr/>
+        <p:txBody>
+          <a:bodyPr/>
+          <a:lstStyle/>
+          <a:p>
+            <a:endParaRPr lang="en-US"/>
+          </a:p>
+        </p:txBody>
+      </p:sp>
+      <p:sp>
+        <p:nvSpPr>
+          <p:cNvPr id="4" name="Date Placeholder 3"/>
+          <p:cNvSpPr>
+            <a:spLocks noGrp="1"/>
+          </p:cNvSpPr>
+          <p:nvPr>
+            <p:ph type="dt" sz="half" idx="10"/>
+          </p:nvPr>
+        </p:nvSpPr>
+        <p:spPr/>
+        <p:txBody>
+          <a:bodyPr/>
+          <a:lstStyle/>
+          <a:p>
+            <a:r>
+              <a:rPr lang="x-none" smtClean="0"/>
+              <a:t>3/30/16</a:t>
+            </a:r>
+            <a:endParaRPr lang="en-US"/>
+          </a:p>
+        </p:txBody>
+      </p:sp>
+      <p:sp>
+        <p:nvSpPr>
+          <p:cNvPr id="5" name="Footer Placeholder 4"/>
+          <p:cNvSpPr>
+            <a:spLocks noGrp="1"/>
+          </p:cNvSpPr>
+          <p:nvPr>
+            <p:ph type="ftr" sz="quarter" idx="11"/>
+          </p:nvPr>
+        </p:nvSpPr>
+        <p:spPr/>
+        <p:txBody>
+          <a:bodyPr/>
+          <a:lstStyle/>
+          <a:p>
+            <a:r>
+              <a:rPr lang="ja-JP" altLang="en-US" smtClean="0"/>
+              <a:t>サイボウズ・ラボユース成果報告会</a:t>
+            </a:r>
+            <a:endParaRPr lang="en-US"/>
+          </a:p>
+        </p:txBody>
+      </p:sp>
+      <p:sp>
+        <p:nvSpPr>
+          <p:cNvPr id="6" name="Slide Number Placeholder 5"/>
+          <p:cNvSpPr>
+            <a:spLocks noGrp="1"/>
+          </p:cNvSpPr>
+          <p:nvPr>
+            <p:ph type="sldNum" sz="quarter" idx="12"/>
+          </p:nvPr>
+        </p:nvSpPr>
+        <p:spPr/>
+        <p:txBody>
+          <a:bodyPr/>
+          <a:lstStyle/>
+          <a:p>
+            <a:fld id="{CC15D400-9C14-254D-84D7-AF2EB5526E40}" type="slidenum">
+              <a:rPr lang="en-US" smtClean="0"/>
+              <a:t>9</a:t>
+            </a:fld>
+            <a:endParaRPr lang="en-US"/>
+          </a:p>
+        </p:txBody>
+      </p:sp>
+    </p:spTree>
+    <p:extLst>
+      <p:ext uri="{BB962C8B-B14F-4D97-AF65-F5344CB8AC3E}">
+        <p14:creationId xmlns:p14="http://schemas.microsoft.com/office/powerpoint/2010/main" val="543117660"/>
+      </p:ext>
+    </p:extLst>
+  </p:cSld>
+  <p:clrMapOvr>
+    <a:masterClrMapping/>
+  </p:clrMapOvr>
+  <p:timing>
+    <p:tnLst>
+      <p:par>
+        <p:cTn id="1" dur="indefinite" restart="never" nodeType="tmRoot"/>
+      </p:par>
+    </p:tnLst>
+  </p:timing>
 </p:sld>
 </file>
 

</xml_diff>